<commit_message>
Final update pour de vrai
</commit_message>
<xml_diff>
--- a/Présentation/Présentation TPI DMA.pptx
+++ b/Présentation/Présentation TPI DMA.pptx
@@ -5,7 +5,7 @@
     <p:sldMasterId id="2147483802" r:id="rId1"/>
   </p:sldMasterIdLst>
   <p:notesMasterIdLst>
-    <p:notesMasterId r:id="rId18"/>
+    <p:notesMasterId r:id="rId19"/>
   </p:notesMasterIdLst>
   <p:sldIdLst>
     <p:sldId id="256" r:id="rId2"/>
@@ -24,6 +24,7 @@
     <p:sldId id="300" r:id="rId15"/>
     <p:sldId id="263" r:id="rId16"/>
     <p:sldId id="264" r:id="rId17"/>
+    <p:sldId id="301" r:id="rId18"/>
   </p:sldIdLst>
   <p:sldSz cx="12192000" cy="6858000"/>
   <p:notesSz cx="6858000" cy="9144000"/>
@@ -14859,6 +14860,170 @@
 </p:sld>
 </file>
 
+<file path=ppt/slides/slide17.xml><?xml version="1.0" encoding="utf-8"?>
+<p:sld xmlns:a="http://schemas.openxmlformats.org/drawingml/2006/main" xmlns:r="http://schemas.openxmlformats.org/officeDocument/2006/relationships" xmlns:p="http://schemas.openxmlformats.org/presentationml/2006/main">
+  <p:cSld>
+    <p:spTree>
+      <p:nvGrpSpPr>
+        <p:cNvPr id="1" name=""/>
+        <p:cNvGrpSpPr/>
+        <p:nvPr/>
+      </p:nvGrpSpPr>
+      <p:grpSpPr>
+        <a:xfrm>
+          <a:off x="0" y="0"/>
+          <a:ext cx="0" cy="0"/>
+          <a:chOff x="0" y="0"/>
+          <a:chExt cx="0" cy="0"/>
+        </a:xfrm>
+      </p:grpSpPr>
+      <p:sp>
+        <p:nvSpPr>
+          <p:cNvPr id="2" name="Titre 1">
+            <a:extLst>
+              <a:ext uri="{FF2B5EF4-FFF2-40B4-BE49-F238E27FC236}">
+                <a16:creationId xmlns:a16="http://schemas.microsoft.com/office/drawing/2014/main" id="{BD99B964-E212-9479-78E7-5006D359A701}"/>
+              </a:ext>
+            </a:extLst>
+          </p:cNvPr>
+          <p:cNvSpPr>
+            <a:spLocks noGrp="1"/>
+          </p:cNvSpPr>
+          <p:nvPr>
+            <p:ph type="title"/>
+          </p:nvPr>
+        </p:nvSpPr>
+        <p:spPr/>
+        <p:txBody>
+          <a:bodyPr/>
+          <a:lstStyle/>
+          <a:p>
+            <a:r>
+              <a:rPr lang="fr-CH" dirty="0"/>
+              <a:t>Slide de réserve</a:t>
+            </a:r>
+          </a:p>
+        </p:txBody>
+      </p:sp>
+      <p:sp>
+        <p:nvSpPr>
+          <p:cNvPr id="4" name="Espace réservé du pied de page 3">
+            <a:extLst>
+              <a:ext uri="{FF2B5EF4-FFF2-40B4-BE49-F238E27FC236}">
+                <a16:creationId xmlns:a16="http://schemas.microsoft.com/office/drawing/2014/main" id="{6F0D8D0F-CDE0-B311-75D6-DBA9B60A28AB}"/>
+              </a:ext>
+            </a:extLst>
+          </p:cNvPr>
+          <p:cNvSpPr>
+            <a:spLocks noGrp="1"/>
+          </p:cNvSpPr>
+          <p:nvPr>
+            <p:ph type="ftr" sz="quarter" idx="11"/>
+          </p:nvPr>
+        </p:nvSpPr>
+        <p:spPr/>
+        <p:txBody>
+          <a:bodyPr/>
+          <a:lstStyle/>
+          <a:p>
+            <a:r>
+              <a:rPr lang="fr-CH"/>
+              <a:t>Damien Mayor</a:t>
+            </a:r>
+          </a:p>
+        </p:txBody>
+      </p:sp>
+      <p:sp>
+        <p:nvSpPr>
+          <p:cNvPr id="5" name="Espace réservé du numéro de diapositive 4">
+            <a:extLst>
+              <a:ext uri="{FF2B5EF4-FFF2-40B4-BE49-F238E27FC236}">
+                <a16:creationId xmlns:a16="http://schemas.microsoft.com/office/drawing/2014/main" id="{3DE19E0F-0D33-9927-8E6C-D5E546E827A6}"/>
+              </a:ext>
+            </a:extLst>
+          </p:cNvPr>
+          <p:cNvSpPr>
+            <a:spLocks noGrp="1"/>
+          </p:cNvSpPr>
+          <p:nvPr>
+            <p:ph type="sldNum" sz="quarter" idx="12"/>
+          </p:nvPr>
+        </p:nvSpPr>
+        <p:spPr/>
+        <p:txBody>
+          <a:bodyPr/>
+          <a:lstStyle/>
+          <a:p>
+            <a:fld id="{2FCD9DE2-19B8-4E75-A167-0E6B1D03D668}" type="slidenum">
+              <a:rPr lang="fr-CH" smtClean="0"/>
+              <a:t>17</a:t>
+            </a:fld>
+            <a:endParaRPr lang="fr-CH"/>
+          </a:p>
+        </p:txBody>
+      </p:sp>
+      <p:pic>
+        <p:nvPicPr>
+          <p:cNvPr id="1026" name="Picture 2">
+            <a:extLst>
+              <a:ext uri="{FF2B5EF4-FFF2-40B4-BE49-F238E27FC236}">
+                <a16:creationId xmlns:a16="http://schemas.microsoft.com/office/drawing/2014/main" id="{A705017F-8C9F-ED9B-3613-48F2C5D274A5}"/>
+              </a:ext>
+            </a:extLst>
+          </p:cNvPr>
+          <p:cNvPicPr>
+            <a:picLocks noGrp="1" noChangeAspect="1" noChangeArrowheads="1"/>
+          </p:cNvPicPr>
+          <p:nvPr>
+            <p:ph idx="1"/>
+          </p:nvPr>
+        </p:nvPicPr>
+        <p:blipFill>
+          <a:blip r:embed="rId2">
+            <a:extLst>
+              <a:ext uri="{28A0092B-C50C-407E-A947-70E740481C1C}">
+                <a14:useLocalDpi xmlns:a14="http://schemas.microsoft.com/office/drawing/2010/main" val="0"/>
+              </a:ext>
+            </a:extLst>
+          </a:blip>
+          <a:srcRect/>
+          <a:stretch>
+            <a:fillRect/>
+          </a:stretch>
+        </p:blipFill>
+        <p:spPr bwMode="auto">
+          <a:xfrm>
+            <a:off x="3960488" y="2052638"/>
+            <a:ext cx="3232800" cy="4195762"/>
+          </a:xfrm>
+          <a:prstGeom prst="rect">
+            <a:avLst/>
+          </a:prstGeom>
+          <a:noFill/>
+          <a:extLst>
+            <a:ext uri="{909E8E84-426E-40DD-AFC4-6F175D3DCCD1}">
+              <a14:hiddenFill xmlns:a14="http://schemas.microsoft.com/office/drawing/2010/main">
+                <a:solidFill>
+                  <a:srgbClr val="FFFFFF"/>
+                </a:solidFill>
+              </a14:hiddenFill>
+            </a:ext>
+          </a:extLst>
+        </p:spPr>
+      </p:pic>
+    </p:spTree>
+    <p:extLst>
+      <p:ext uri="{BB962C8B-B14F-4D97-AF65-F5344CB8AC3E}">
+        <p14:creationId xmlns:p14="http://schemas.microsoft.com/office/powerpoint/2010/main" val="3569477182"/>
+      </p:ext>
+    </p:extLst>
+  </p:cSld>
+  <p:clrMapOvr>
+    <a:masterClrMapping/>
+  </p:clrMapOvr>
+</p:sld>
+</file>
+
 <file path=ppt/slides/slide2.xml><?xml version="1.0" encoding="utf-8"?>
 <p:sld xmlns:a="http://schemas.openxmlformats.org/drawingml/2006/main" xmlns:r="http://schemas.openxmlformats.org/officeDocument/2006/relationships" xmlns:p="http://schemas.openxmlformats.org/presentationml/2006/main">
   <p:cSld>
@@ -15288,7 +15453,7 @@
         <p:spPr>
           <a:xfrm>
             <a:off x="1154953" y="4056833"/>
-            <a:ext cx="8825659" cy="991785"/>
+            <a:ext cx="8825659" cy="1164872"/>
           </a:xfrm>
           <a:prstGeom prst="rect">
             <a:avLst/>
@@ -15397,7 +15562,7 @@
           <a:p>
             <a:r>
               <a:rPr lang="fr-CH" sz="2400" dirty="0"/>
-              <a:t>Le pare-feu est l’un des moyens de défense d'un réseau.</a:t>
+              <a:t>Le pare-feu, appareil de sécurité par excellence offre des possibilités bien au-delà du filtrage</a:t>
             </a:r>
           </a:p>
         </p:txBody>
@@ -15668,7 +15833,7 @@
         </p:nvSpPr>
         <p:spPr>
           <a:xfrm>
-            <a:off x="1154951" y="5314463"/>
+            <a:off x="1154951" y="5499662"/>
             <a:ext cx="8825659" cy="991785"/>
           </a:xfrm>
           <a:prstGeom prst="rect">
@@ -15778,7 +15943,7 @@
           <a:p>
             <a:r>
               <a:rPr lang="fr-CH" sz="2400" dirty="0"/>
-              <a:t>C'est la raison de ma reconversion professionnelle</a:t>
+              <a:t>Intérêt pour la sécurité informatique</a:t>
             </a:r>
           </a:p>
         </p:txBody>

</xml_diff>